<commit_message>
Changed diagrams relating to Priority
</commit_message>
<xml_diff>
--- a/docs/diagrams/ImplementationPrioritySequenceDiagramUML.pptx
+++ b/docs/diagrams/ImplementationPrioritySequenceDiagramUML.pptx
@@ -3004,6 +3004,42 @@
           <a:chExt cx="0" cy="0"/>
         </a:xfrm>
       </p:grpSpPr>
+      <p:cxnSp>
+        <p:nvCxnSpPr>
+          <p:cNvPr id="85" name="Straight Connector 84"/>
+          <p:cNvCxnSpPr/>
+          <p:nvPr/>
+        </p:nvCxnSpPr>
+        <p:spPr>
+          <a:xfrm>
+            <a:off x="10060467" y="2128244"/>
+            <a:ext cx="38135" cy="3783252"/>
+          </a:xfrm>
+          <a:prstGeom prst="line">
+            <a:avLst/>
+          </a:prstGeom>
+          <a:ln>
+            <a:solidFill>
+              <a:schemeClr val="tx1"/>
+            </a:solidFill>
+            <a:prstDash val="dash"/>
+          </a:ln>
+        </p:spPr>
+        <p:style>
+          <a:lnRef idx="1">
+            <a:schemeClr val="accent1"/>
+          </a:lnRef>
+          <a:fillRef idx="0">
+            <a:schemeClr val="accent1"/>
+          </a:fillRef>
+          <a:effectRef idx="0">
+            <a:schemeClr val="accent1"/>
+          </a:effectRef>
+          <a:fontRef idx="minor">
+            <a:schemeClr val="tx1"/>
+          </a:fontRef>
+        </p:style>
+      </p:cxnSp>
       <p:sp>
         <p:nvSpPr>
           <p:cNvPr id="4" name="Rectangle 3"/>
@@ -3107,7 +3143,7 @@
           <a:lstStyle/>
           <a:p>
             <a:pPr algn="ctr"/>
-            <a:endParaRPr lang="en-SG"/>
+            <a:endParaRPr lang="en-SG" dirty="0"/>
           </a:p>
         </p:txBody>
       </p:sp>
@@ -3453,9 +3489,9 @@
           <p:nvPr/>
         </p:nvCxnSpPr>
         <p:spPr>
-          <a:xfrm flipH="1">
-            <a:off x="8217387" y="1220967"/>
-            <a:ext cx="1" cy="483056"/>
+          <a:xfrm>
+            <a:off x="8219495" y="1183149"/>
+            <a:ext cx="6353" cy="1966302"/>
           </a:xfrm>
           <a:prstGeom prst="line">
             <a:avLst/>
@@ -3490,8 +3526,8 @@
         </p:nvSpPr>
         <p:spPr>
           <a:xfrm>
-            <a:off x="8076673" y="1704023"/>
-            <a:ext cx="281428" cy="1450508"/>
+            <a:off x="8069336" y="1825946"/>
+            <a:ext cx="281428" cy="1196158"/>
           </a:xfrm>
           <a:prstGeom prst="rect">
             <a:avLst/>
@@ -4093,44 +4129,6 @@
       </p:sp>
       <p:cxnSp>
         <p:nvCxnSpPr>
-          <p:cNvPr id="58" name="Straight Connector 57"/>
-          <p:cNvCxnSpPr>
-            <a:endCxn id="26" idx="2"/>
-          </p:cNvCxnSpPr>
-          <p:nvPr/>
-        </p:nvCxnSpPr>
-        <p:spPr>
-          <a:xfrm>
-            <a:off x="8216984" y="3140766"/>
-            <a:ext cx="403" cy="13765"/>
-          </a:xfrm>
-          <a:prstGeom prst="line">
-            <a:avLst/>
-          </a:prstGeom>
-          <a:ln>
-            <a:solidFill>
-              <a:schemeClr val="tx1"/>
-            </a:solidFill>
-            <a:prstDash val="dash"/>
-          </a:ln>
-        </p:spPr>
-        <p:style>
-          <a:lnRef idx="1">
-            <a:schemeClr val="accent1"/>
-          </a:lnRef>
-          <a:fillRef idx="0">
-            <a:schemeClr val="accent1"/>
-          </a:fillRef>
-          <a:effectRef idx="0">
-            <a:schemeClr val="accent1"/>
-          </a:effectRef>
-          <a:fontRef idx="minor">
-            <a:schemeClr val="tx1"/>
-          </a:fontRef>
-        </p:style>
-      </p:cxnSp>
-      <p:cxnSp>
-        <p:nvCxnSpPr>
           <p:cNvPr id="60" name="Straight Arrow Connector 59"/>
           <p:cNvCxnSpPr/>
           <p:nvPr/>
@@ -4298,7 +4296,7 @@
         </p:nvCxnSpPr>
         <p:spPr>
           <a:xfrm>
-            <a:off x="6913889" y="1962542"/>
+            <a:off x="6913889" y="1825946"/>
             <a:ext cx="1104016" cy="0"/>
           </a:xfrm>
           <a:prstGeom prst="straightConnector1">
@@ -4334,7 +4332,7 @@
         </p:nvSpPr>
         <p:spPr>
           <a:xfrm>
-            <a:off x="6832126" y="1655758"/>
+            <a:off x="6827913" y="1564336"/>
             <a:ext cx="1868557" cy="261610"/>
           </a:xfrm>
           <a:prstGeom prst="rect">
@@ -5257,11 +5255,7 @@
           <a:p>
             <a:r>
               <a:rPr lang="en-US" sz="700" dirty="0" err="1" smtClean="0"/>
-              <a:t>g</a:t>
-            </a:r>
-            <a:r>
-              <a:rPr lang="en-US" sz="700" dirty="0" err="1" smtClean="0"/>
-              <a:t>etBorder</a:t>
+              <a:t>getBorder</a:t>
             </a:r>
             <a:r>
               <a:rPr lang="en-US" sz="700" dirty="0" smtClean="0"/>
@@ -5573,11 +5567,7 @@
           <a:p>
             <a:r>
               <a:rPr lang="en-US" sz="700" dirty="0" err="1" smtClean="0"/>
-              <a:t>g</a:t>
-            </a:r>
-            <a:r>
-              <a:rPr lang="en-US" sz="700" dirty="0" err="1" smtClean="0"/>
-              <a:t>etBackground</a:t>
+              <a:t>getBackground</a:t>
             </a:r>
             <a:r>
               <a:rPr lang="en-US" sz="700" dirty="0" smtClean="0"/>
@@ -5923,6 +5913,104 @@
           </a:fontRef>
         </p:style>
       </p:cxnSp>
+      <p:sp>
+        <p:nvSpPr>
+          <p:cNvPr id="12" name="TextBox 11"/>
+          <p:cNvSpPr txBox="1"/>
+          <p:nvPr/>
+        </p:nvSpPr>
+        <p:spPr>
+          <a:xfrm>
+            <a:off x="8072129" y="2956862"/>
+            <a:ext cx="304892" cy="369332"/>
+          </a:xfrm>
+          <a:prstGeom prst="rect">
+            <a:avLst/>
+          </a:prstGeom>
+          <a:noFill/>
+        </p:spPr>
+        <p:txBody>
+          <a:bodyPr wrap="none" rtlCol="0">
+            <a:spAutoFit/>
+          </a:bodyPr>
+          <a:lstStyle/>
+          <a:p>
+            <a:r>
+              <a:rPr lang="en-US" dirty="0" smtClean="0"/>
+              <a:t>X</a:t>
+            </a:r>
+            <a:endParaRPr lang="en-SG" dirty="0"/>
+          </a:p>
+        </p:txBody>
+      </p:sp>
+      <p:cxnSp>
+        <p:nvCxnSpPr>
+          <p:cNvPr id="91" name="Straight Connector 90"/>
+          <p:cNvCxnSpPr>
+            <a:stCxn id="16" idx="0"/>
+          </p:cNvCxnSpPr>
+          <p:nvPr/>
+        </p:nvCxnSpPr>
+        <p:spPr>
+          <a:xfrm>
+            <a:off x="10071362" y="2500712"/>
+            <a:ext cx="5202" cy="204986"/>
+          </a:xfrm>
+          <a:prstGeom prst="line">
+            <a:avLst/>
+          </a:prstGeom>
+          <a:ln>
+            <a:solidFill>
+              <a:schemeClr val="tx1"/>
+            </a:solidFill>
+            <a:prstDash val="dash"/>
+          </a:ln>
+        </p:spPr>
+        <p:style>
+          <a:lnRef idx="1">
+            <a:schemeClr val="accent1"/>
+          </a:lnRef>
+          <a:fillRef idx="0">
+            <a:schemeClr val="accent1"/>
+          </a:fillRef>
+          <a:effectRef idx="0">
+            <a:schemeClr val="accent1"/>
+          </a:effectRef>
+          <a:fontRef idx="minor">
+            <a:schemeClr val="tx1"/>
+          </a:fontRef>
+        </p:style>
+      </p:cxnSp>
+      <p:sp>
+        <p:nvSpPr>
+          <p:cNvPr id="16" name="TextBox 15"/>
+          <p:cNvSpPr txBox="1"/>
+          <p:nvPr/>
+        </p:nvSpPr>
+        <p:spPr>
+          <a:xfrm>
+            <a:off x="9918916" y="2500712"/>
+            <a:ext cx="304892" cy="369332"/>
+          </a:xfrm>
+          <a:prstGeom prst="rect">
+            <a:avLst/>
+          </a:prstGeom>
+          <a:noFill/>
+        </p:spPr>
+        <p:txBody>
+          <a:bodyPr wrap="none" rtlCol="0">
+            <a:spAutoFit/>
+          </a:bodyPr>
+          <a:lstStyle/>
+          <a:p>
+            <a:r>
+              <a:rPr lang="en-US" dirty="0" smtClean="0"/>
+              <a:t>X</a:t>
+            </a:r>
+            <a:endParaRPr lang="en-SG" dirty="0"/>
+          </a:p>
+        </p:txBody>
+      </p:sp>
     </p:spTree>
     <p:extLst>
       <p:ext uri="{BB962C8B-B14F-4D97-AF65-F5344CB8AC3E}">

</xml_diff>

<commit_message>
Update Priority diagram v2
</commit_message>
<xml_diff>
--- a/docs/diagrams/ImplementationPrioritySequenceDiagramUML.pptx
+++ b/docs/diagrams/ImplementationPrioritySequenceDiagramUML.pptx
@@ -3004,80 +3004,6 @@
           <a:chExt cx="0" cy="0"/>
         </a:xfrm>
       </p:grpSpPr>
-      <p:cxnSp>
-        <p:nvCxnSpPr>
-          <p:cNvPr id="85" name="Straight Connector 84"/>
-          <p:cNvCxnSpPr/>
-          <p:nvPr/>
-        </p:nvCxnSpPr>
-        <p:spPr>
-          <a:xfrm>
-            <a:off x="10060467" y="2128244"/>
-            <a:ext cx="38135" cy="3783252"/>
-          </a:xfrm>
-          <a:prstGeom prst="line">
-            <a:avLst/>
-          </a:prstGeom>
-          <a:ln>
-            <a:solidFill>
-              <a:schemeClr val="tx1"/>
-            </a:solidFill>
-            <a:prstDash val="dash"/>
-          </a:ln>
-        </p:spPr>
-        <p:style>
-          <a:lnRef idx="1">
-            <a:schemeClr val="accent1"/>
-          </a:lnRef>
-          <a:fillRef idx="0">
-            <a:schemeClr val="accent1"/>
-          </a:fillRef>
-          <a:effectRef idx="0">
-            <a:schemeClr val="accent1"/>
-          </a:effectRef>
-          <a:fontRef idx="minor">
-            <a:schemeClr val="tx1"/>
-          </a:fontRef>
-        </p:style>
-      </p:cxnSp>
-      <p:sp>
-        <p:nvSpPr>
-          <p:cNvPr id="4" name="Rectangle 3"/>
-          <p:cNvSpPr/>
-          <p:nvPr/>
-        </p:nvSpPr>
-        <p:spPr>
-          <a:xfrm>
-            <a:off x="119413" y="411331"/>
-            <a:ext cx="6164444" cy="5486400"/>
-          </a:xfrm>
-          <a:prstGeom prst="rect">
-            <a:avLst/>
-          </a:prstGeom>
-        </p:spPr>
-        <p:style>
-          <a:lnRef idx="2">
-            <a:schemeClr val="accent1"/>
-          </a:lnRef>
-          <a:fillRef idx="1">
-            <a:schemeClr val="lt1"/>
-          </a:fillRef>
-          <a:effectRef idx="0">
-            <a:schemeClr val="accent1"/>
-          </a:effectRef>
-          <a:fontRef idx="minor">
-            <a:schemeClr val="dk1"/>
-          </a:fontRef>
-        </p:style>
-        <p:txBody>
-          <a:bodyPr rtlCol="0" anchor="ctr"/>
-          <a:lstStyle/>
-          <a:p>
-            <a:pPr algn="ctr"/>
-            <a:endParaRPr lang="en-SG"/>
-          </a:p>
-        </p:txBody>
-      </p:sp>
       <p:sp>
         <p:nvSpPr>
           <p:cNvPr id="5" name="TextBox 4"/>
@@ -3086,7 +3012,7 @@
         </p:nvSpPr>
         <p:spPr>
           <a:xfrm>
-            <a:off x="1822177" y="397566"/>
+            <a:off x="4570264" y="202846"/>
             <a:ext cx="2623931" cy="371060"/>
           </a:xfrm>
           <a:prstGeom prst="rect">
@@ -3111,83 +3037,14 @@
       </p:sp>
       <p:sp>
         <p:nvSpPr>
-          <p:cNvPr id="7" name="Rectangle 6"/>
-          <p:cNvSpPr/>
-          <p:nvPr/>
-        </p:nvSpPr>
-        <p:spPr>
-          <a:xfrm>
-            <a:off x="6426961" y="397566"/>
-            <a:ext cx="4221363" cy="5486400"/>
-          </a:xfrm>
-          <a:prstGeom prst="rect">
-            <a:avLst/>
-          </a:prstGeom>
-        </p:spPr>
-        <p:style>
-          <a:lnRef idx="2">
-            <a:schemeClr val="accent6"/>
-          </a:lnRef>
-          <a:fillRef idx="1">
-            <a:schemeClr val="lt1"/>
-          </a:fillRef>
-          <a:effectRef idx="0">
-            <a:schemeClr val="accent6"/>
-          </a:effectRef>
-          <a:fontRef idx="minor">
-            <a:schemeClr val="dk1"/>
-          </a:fontRef>
-        </p:style>
-        <p:txBody>
-          <a:bodyPr rtlCol="0" anchor="ctr"/>
-          <a:lstStyle/>
-          <a:p>
-            <a:pPr algn="ctr"/>
-            <a:endParaRPr lang="en-SG" dirty="0"/>
-          </a:p>
-        </p:txBody>
-      </p:sp>
-      <p:sp>
-        <p:nvSpPr>
-          <p:cNvPr id="8" name="TextBox 7"/>
-          <p:cNvSpPr txBox="1"/>
-          <p:nvPr/>
-        </p:nvSpPr>
-        <p:spPr>
-          <a:xfrm>
-            <a:off x="7252034" y="406341"/>
-            <a:ext cx="2623931" cy="371060"/>
-          </a:xfrm>
-          <a:prstGeom prst="rect">
-            <a:avLst/>
-          </a:prstGeom>
-          <a:noFill/>
-        </p:spPr>
-        <p:txBody>
-          <a:bodyPr wrap="square" rtlCol="0">
-            <a:spAutoFit/>
-          </a:bodyPr>
-          <a:lstStyle/>
-          <a:p>
-            <a:pPr algn="ctr"/>
-            <a:r>
-              <a:rPr lang="en-US" dirty="0" smtClean="0"/>
-              <a:t>Logic</a:t>
-            </a:r>
-            <a:endParaRPr lang="en-SG" dirty="0"/>
-          </a:p>
-        </p:txBody>
-      </p:sp>
-      <p:sp>
-        <p:nvSpPr>
           <p:cNvPr id="6" name="Rectangle 5"/>
           <p:cNvSpPr/>
           <p:nvPr/>
         </p:nvSpPr>
         <p:spPr>
           <a:xfrm>
-            <a:off x="427056" y="716860"/>
-            <a:ext cx="1110595" cy="477078"/>
+            <a:off x="304800" y="716860"/>
+            <a:ext cx="1232851" cy="477078"/>
           </a:xfrm>
           <a:prstGeom prst="rect">
             <a:avLst/>
@@ -3215,80 +3072,14 @@
           <a:p>
             <a:pPr algn="ctr"/>
             <a:r>
-              <a:rPr lang="en-US" sz="1200" dirty="0" smtClean="0"/>
+              <a:rPr lang="en-US" sz="1400" dirty="0" smtClean="0"/>
               <a:t>:</a:t>
             </a:r>
             <a:r>
-              <a:rPr lang="en-US" sz="1200" dirty="0" err="1" smtClean="0"/>
+              <a:rPr lang="en-US" sz="1400" dirty="0" err="1" smtClean="0"/>
               <a:t>MainWindow</a:t>
             </a:r>
-            <a:endParaRPr lang="en-SG" sz="1200" dirty="0"/>
-          </a:p>
-        </p:txBody>
-      </p:sp>
-      <p:cxnSp>
-        <p:nvCxnSpPr>
-          <p:cNvPr id="13" name="Straight Arrow Connector 12"/>
-          <p:cNvCxnSpPr/>
-          <p:nvPr/>
-        </p:nvCxnSpPr>
-        <p:spPr>
-          <a:xfrm>
-            <a:off x="7545" y="1646176"/>
-            <a:ext cx="775227" cy="11175"/>
-          </a:xfrm>
-          <a:prstGeom prst="straightConnector1">
-            <a:avLst/>
-          </a:prstGeom>
-          <a:ln>
-            <a:solidFill>
-              <a:schemeClr val="tx1"/>
-            </a:solidFill>
-            <a:tailEnd type="triangle"/>
-          </a:ln>
-        </p:spPr>
-        <p:style>
-          <a:lnRef idx="1">
-            <a:schemeClr val="accent1"/>
-          </a:lnRef>
-          <a:fillRef idx="0">
-            <a:schemeClr val="accent1"/>
-          </a:fillRef>
-          <a:effectRef idx="0">
-            <a:schemeClr val="accent1"/>
-          </a:effectRef>
-          <a:fontRef idx="minor">
-            <a:schemeClr val="tx1"/>
-          </a:fontRef>
-        </p:style>
-      </p:cxnSp>
-      <p:sp>
-        <p:nvSpPr>
-          <p:cNvPr id="15" name="TextBox 14"/>
-          <p:cNvSpPr txBox="1"/>
-          <p:nvPr/>
-        </p:nvSpPr>
-        <p:spPr>
-          <a:xfrm>
-            <a:off x="72683" y="1341337"/>
-            <a:ext cx="1868557" cy="261610"/>
-          </a:xfrm>
-          <a:prstGeom prst="rect">
-            <a:avLst/>
-          </a:prstGeom>
-          <a:noFill/>
-        </p:spPr>
-        <p:txBody>
-          <a:bodyPr wrap="square" rtlCol="0">
-            <a:spAutoFit/>
-          </a:bodyPr>
-          <a:lstStyle/>
-          <a:p>
-            <a:r>
-              <a:rPr lang="en-US" sz="1050" dirty="0" smtClean="0"/>
-              <a:t>“Add n/meme /l H”</a:t>
-            </a:r>
-            <a:endParaRPr lang="en-SG" sz="1050" dirty="0"/>
+            <a:endParaRPr lang="en-SG" sz="1400" dirty="0"/>
           </a:p>
         </p:txBody>
       </p:sp>
@@ -3336,8 +3127,8 @@
         </p:nvSpPr>
         <p:spPr>
           <a:xfrm>
-            <a:off x="799574" y="1608998"/>
-            <a:ext cx="292643" cy="4136709"/>
+            <a:off x="799574" y="2791968"/>
+            <a:ext cx="292643" cy="2953739"/>
           </a:xfrm>
           <a:prstGeom prst="rect">
             <a:avLst/>
@@ -3368,996 +3159,6 @@
           </a:p>
         </p:txBody>
       </p:sp>
-      <p:cxnSp>
-        <p:nvCxnSpPr>
-          <p:cNvPr id="21" name="Straight Arrow Connector 20"/>
-          <p:cNvCxnSpPr/>
-          <p:nvPr/>
-        </p:nvCxnSpPr>
-        <p:spPr>
-          <a:xfrm flipV="1">
-            <a:off x="1092217" y="1764617"/>
-            <a:ext cx="5498410" cy="30865"/>
-          </a:xfrm>
-          <a:prstGeom prst="straightConnector1">
-            <a:avLst/>
-          </a:prstGeom>
-          <a:ln>
-            <a:solidFill>
-              <a:schemeClr val="tx1"/>
-            </a:solidFill>
-            <a:tailEnd type="triangle"/>
-          </a:ln>
-        </p:spPr>
-        <p:style>
-          <a:lnRef idx="1">
-            <a:schemeClr val="accent1"/>
-          </a:lnRef>
-          <a:fillRef idx="0">
-            <a:schemeClr val="accent1"/>
-          </a:fillRef>
-          <a:effectRef idx="0">
-            <a:schemeClr val="accent1"/>
-          </a:effectRef>
-          <a:fontRef idx="minor">
-            <a:schemeClr val="tx1"/>
-          </a:fontRef>
-        </p:style>
-      </p:cxnSp>
-      <p:sp>
-        <p:nvSpPr>
-          <p:cNvPr id="23" name="Rectangle 22"/>
-          <p:cNvSpPr/>
-          <p:nvPr/>
-        </p:nvSpPr>
-        <p:spPr>
-          <a:xfrm>
-            <a:off x="7516869" y="851606"/>
-            <a:ext cx="1579393" cy="318494"/>
-          </a:xfrm>
-          <a:prstGeom prst="rect">
-            <a:avLst/>
-          </a:prstGeom>
-        </p:spPr>
-        <p:style>
-          <a:lnRef idx="2">
-            <a:schemeClr val="accent6">
-              <a:shade val="50000"/>
-            </a:schemeClr>
-          </a:lnRef>
-          <a:fillRef idx="1">
-            <a:schemeClr val="accent6"/>
-          </a:fillRef>
-          <a:effectRef idx="0">
-            <a:schemeClr val="accent6"/>
-          </a:effectRef>
-          <a:fontRef idx="minor">
-            <a:schemeClr val="lt1"/>
-          </a:fontRef>
-        </p:style>
-        <p:txBody>
-          <a:bodyPr rtlCol="0" anchor="ctr"/>
-          <a:lstStyle/>
-          <a:p>
-            <a:pPr algn="ctr"/>
-            <a:r>
-              <a:rPr lang="en-US" sz="1200" dirty="0" smtClean="0"/>
-              <a:t>:</a:t>
-            </a:r>
-            <a:r>
-              <a:rPr lang="en-US" sz="1200" dirty="0" err="1" smtClean="0"/>
-              <a:t>AddCommandParser</a:t>
-            </a:r>
-            <a:endParaRPr lang="en-SG" sz="1200" dirty="0"/>
-          </a:p>
-        </p:txBody>
-      </p:sp>
-      <p:sp>
-        <p:nvSpPr>
-          <p:cNvPr id="24" name="TextBox 23"/>
-          <p:cNvSpPr txBox="1"/>
-          <p:nvPr/>
-        </p:nvSpPr>
-        <p:spPr>
-          <a:xfrm>
-            <a:off x="4993555" y="1479837"/>
-            <a:ext cx="1868557" cy="276999"/>
-          </a:xfrm>
-          <a:prstGeom prst="rect">
-            <a:avLst/>
-          </a:prstGeom>
-          <a:noFill/>
-        </p:spPr>
-        <p:txBody>
-          <a:bodyPr wrap="square" rtlCol="0">
-            <a:spAutoFit/>
-          </a:bodyPr>
-          <a:lstStyle/>
-          <a:p>
-            <a:r>
-              <a:rPr lang="en-US" sz="1200" dirty="0" smtClean="0"/>
-              <a:t>“Add n/meme /l H”</a:t>
-            </a:r>
-            <a:endParaRPr lang="en-SG" sz="1200" dirty="0"/>
-          </a:p>
-        </p:txBody>
-      </p:sp>
-      <p:cxnSp>
-        <p:nvCxnSpPr>
-          <p:cNvPr id="25" name="Straight Connector 24"/>
-          <p:cNvCxnSpPr/>
-          <p:nvPr/>
-        </p:nvCxnSpPr>
-        <p:spPr>
-          <a:xfrm>
-            <a:off x="8219495" y="1183149"/>
-            <a:ext cx="6353" cy="1966302"/>
-          </a:xfrm>
-          <a:prstGeom prst="line">
-            <a:avLst/>
-          </a:prstGeom>
-          <a:ln>
-            <a:solidFill>
-              <a:schemeClr val="tx1"/>
-            </a:solidFill>
-            <a:prstDash val="dash"/>
-          </a:ln>
-        </p:spPr>
-        <p:style>
-          <a:lnRef idx="1">
-            <a:schemeClr val="accent1"/>
-          </a:lnRef>
-          <a:fillRef idx="0">
-            <a:schemeClr val="accent1"/>
-          </a:fillRef>
-          <a:effectRef idx="0">
-            <a:schemeClr val="accent1"/>
-          </a:effectRef>
-          <a:fontRef idx="minor">
-            <a:schemeClr val="tx1"/>
-          </a:fontRef>
-        </p:style>
-      </p:cxnSp>
-      <p:sp>
-        <p:nvSpPr>
-          <p:cNvPr id="26" name="Rectangle 25"/>
-          <p:cNvSpPr/>
-          <p:nvPr/>
-        </p:nvSpPr>
-        <p:spPr>
-          <a:xfrm>
-            <a:off x="8069336" y="1825946"/>
-            <a:ext cx="281428" cy="1196158"/>
-          </a:xfrm>
-          <a:prstGeom prst="rect">
-            <a:avLst/>
-          </a:prstGeom>
-        </p:spPr>
-        <p:style>
-          <a:lnRef idx="2">
-            <a:schemeClr val="accent6">
-              <a:shade val="50000"/>
-            </a:schemeClr>
-          </a:lnRef>
-          <a:fillRef idx="1">
-            <a:schemeClr val="accent6"/>
-          </a:fillRef>
-          <a:effectRef idx="0">
-            <a:schemeClr val="accent6"/>
-          </a:effectRef>
-          <a:fontRef idx="minor">
-            <a:schemeClr val="lt1"/>
-          </a:fontRef>
-        </p:style>
-        <p:txBody>
-          <a:bodyPr rtlCol="0" anchor="ctr"/>
-          <a:lstStyle/>
-          <a:p>
-            <a:pPr algn="ctr"/>
-            <a:endParaRPr lang="en-SG" dirty="0"/>
-          </a:p>
-        </p:txBody>
-      </p:sp>
-      <p:cxnSp>
-        <p:nvCxnSpPr>
-          <p:cNvPr id="33" name="Straight Arrow Connector 32"/>
-          <p:cNvCxnSpPr/>
-          <p:nvPr/>
-        </p:nvCxnSpPr>
-        <p:spPr>
-          <a:xfrm>
-            <a:off x="8391629" y="1962542"/>
-            <a:ext cx="1102891" cy="0"/>
-          </a:xfrm>
-          <a:prstGeom prst="straightConnector1">
-            <a:avLst/>
-          </a:prstGeom>
-          <a:ln>
-            <a:solidFill>
-              <a:schemeClr val="tx1"/>
-            </a:solidFill>
-            <a:tailEnd type="triangle"/>
-          </a:ln>
-        </p:spPr>
-        <p:style>
-          <a:lnRef idx="1">
-            <a:schemeClr val="accent1"/>
-          </a:lnRef>
-          <a:fillRef idx="0">
-            <a:schemeClr val="accent1"/>
-          </a:fillRef>
-          <a:effectRef idx="0">
-            <a:schemeClr val="accent1"/>
-          </a:effectRef>
-          <a:fontRef idx="minor">
-            <a:schemeClr val="tx1"/>
-          </a:fontRef>
-        </p:style>
-      </p:cxnSp>
-      <p:sp>
-        <p:nvSpPr>
-          <p:cNvPr id="36" name="Rectangle 35"/>
-          <p:cNvSpPr/>
-          <p:nvPr/>
-        </p:nvSpPr>
-        <p:spPr>
-          <a:xfrm>
-            <a:off x="9494520" y="1803295"/>
-            <a:ext cx="1135823" cy="318494"/>
-          </a:xfrm>
-          <a:prstGeom prst="rect">
-            <a:avLst/>
-          </a:prstGeom>
-        </p:spPr>
-        <p:style>
-          <a:lnRef idx="2">
-            <a:schemeClr val="accent6">
-              <a:shade val="50000"/>
-            </a:schemeClr>
-          </a:lnRef>
-          <a:fillRef idx="1">
-            <a:schemeClr val="accent6"/>
-          </a:fillRef>
-          <a:effectRef idx="0">
-            <a:schemeClr val="accent6"/>
-          </a:effectRef>
-          <a:fontRef idx="minor">
-            <a:schemeClr val="lt1"/>
-          </a:fontRef>
-        </p:style>
-        <p:txBody>
-          <a:bodyPr rtlCol="0" anchor="ctr"/>
-          <a:lstStyle/>
-          <a:p>
-            <a:pPr algn="ctr"/>
-            <a:r>
-              <a:rPr lang="en-US" sz="1200" dirty="0" smtClean="0"/>
-              <a:t>:</a:t>
-            </a:r>
-            <a:r>
-              <a:rPr lang="en-US" sz="1200" dirty="0" err="1" smtClean="0"/>
-              <a:t>AddCommand</a:t>
-            </a:r>
-            <a:endParaRPr lang="en-SG" sz="1200" dirty="0"/>
-          </a:p>
-        </p:txBody>
-      </p:sp>
-      <p:sp>
-        <p:nvSpPr>
-          <p:cNvPr id="37" name="TextBox 36"/>
-          <p:cNvSpPr txBox="1"/>
-          <p:nvPr/>
-        </p:nvSpPr>
-        <p:spPr>
-          <a:xfrm>
-            <a:off x="8344826" y="1474190"/>
-            <a:ext cx="1486046" cy="276999"/>
-          </a:xfrm>
-          <a:prstGeom prst="rect">
-            <a:avLst/>
-          </a:prstGeom>
-          <a:noFill/>
-        </p:spPr>
-        <p:txBody>
-          <a:bodyPr wrap="square" rtlCol="0">
-            <a:spAutoFit/>
-          </a:bodyPr>
-          <a:lstStyle/>
-          <a:p>
-            <a:r>
-              <a:rPr lang="en-US" sz="1200" dirty="0"/>
-              <a:t>p</a:t>
-            </a:r>
-            <a:r>
-              <a:rPr lang="en-US" sz="1200" dirty="0" smtClean="0"/>
-              <a:t>arse(</a:t>
-            </a:r>
-            <a:r>
-              <a:rPr lang="en-US" sz="1200" dirty="0" err="1" smtClean="0"/>
-              <a:t>addcommand</a:t>
-            </a:r>
-            <a:r>
-              <a:rPr lang="en-US" sz="1200" dirty="0" smtClean="0"/>
-              <a:t>)</a:t>
-            </a:r>
-            <a:endParaRPr lang="en-SG" sz="1200" dirty="0"/>
-          </a:p>
-        </p:txBody>
-      </p:sp>
-      <p:cxnSp>
-        <p:nvCxnSpPr>
-          <p:cNvPr id="38" name="Straight Connector 37"/>
-          <p:cNvCxnSpPr>
-            <a:endCxn id="40" idx="2"/>
-          </p:cNvCxnSpPr>
-          <p:nvPr/>
-        </p:nvCxnSpPr>
-        <p:spPr>
-          <a:xfrm flipH="1">
-            <a:off x="10053518" y="2374404"/>
-            <a:ext cx="1" cy="123453"/>
-          </a:xfrm>
-          <a:prstGeom prst="line">
-            <a:avLst/>
-          </a:prstGeom>
-          <a:ln>
-            <a:solidFill>
-              <a:schemeClr val="tx1"/>
-            </a:solidFill>
-            <a:prstDash val="dash"/>
-          </a:ln>
-        </p:spPr>
-        <p:style>
-          <a:lnRef idx="1">
-            <a:schemeClr val="accent1"/>
-          </a:lnRef>
-          <a:fillRef idx="0">
-            <a:schemeClr val="accent1"/>
-          </a:fillRef>
-          <a:effectRef idx="0">
-            <a:schemeClr val="accent1"/>
-          </a:effectRef>
-          <a:fontRef idx="minor">
-            <a:schemeClr val="tx1"/>
-          </a:fontRef>
-        </p:style>
-      </p:cxnSp>
-      <p:sp>
-        <p:nvSpPr>
-          <p:cNvPr id="40" name="Rectangle 39"/>
-          <p:cNvSpPr/>
-          <p:nvPr/>
-        </p:nvSpPr>
-        <p:spPr>
-          <a:xfrm>
-            <a:off x="9912804" y="2121789"/>
-            <a:ext cx="281428" cy="376068"/>
-          </a:xfrm>
-          <a:prstGeom prst="rect">
-            <a:avLst/>
-          </a:prstGeom>
-        </p:spPr>
-        <p:style>
-          <a:lnRef idx="2">
-            <a:schemeClr val="accent6">
-              <a:shade val="50000"/>
-            </a:schemeClr>
-          </a:lnRef>
-          <a:fillRef idx="1">
-            <a:schemeClr val="accent6"/>
-          </a:fillRef>
-          <a:effectRef idx="0">
-            <a:schemeClr val="accent6"/>
-          </a:effectRef>
-          <a:fontRef idx="minor">
-            <a:schemeClr val="lt1"/>
-          </a:fontRef>
-        </p:style>
-        <p:txBody>
-          <a:bodyPr rtlCol="0" anchor="ctr"/>
-          <a:lstStyle/>
-          <a:p>
-            <a:pPr algn="ctr"/>
-            <a:endParaRPr lang="en-SG" dirty="0"/>
-          </a:p>
-        </p:txBody>
-      </p:sp>
-      <p:sp>
-        <p:nvSpPr>
-          <p:cNvPr id="43" name="Rectangle 42"/>
-          <p:cNvSpPr/>
-          <p:nvPr/>
-        </p:nvSpPr>
-        <p:spPr>
-          <a:xfrm>
-            <a:off x="10844142" y="397566"/>
-            <a:ext cx="1155360" cy="5486400"/>
-          </a:xfrm>
-          <a:prstGeom prst="rect">
-            <a:avLst/>
-          </a:prstGeom>
-        </p:spPr>
-        <p:style>
-          <a:lnRef idx="2">
-            <a:schemeClr val="accent2"/>
-          </a:lnRef>
-          <a:fillRef idx="1">
-            <a:schemeClr val="lt1"/>
-          </a:fillRef>
-          <a:effectRef idx="0">
-            <a:schemeClr val="accent2"/>
-          </a:effectRef>
-          <a:fontRef idx="minor">
-            <a:schemeClr val="dk1"/>
-          </a:fontRef>
-        </p:style>
-        <p:txBody>
-          <a:bodyPr rtlCol="0" anchor="ctr"/>
-          <a:lstStyle/>
-          <a:p>
-            <a:pPr algn="ctr"/>
-            <a:endParaRPr lang="en-SG"/>
-          </a:p>
-        </p:txBody>
-      </p:sp>
-      <p:sp>
-        <p:nvSpPr>
-          <p:cNvPr id="44" name="TextBox 43"/>
-          <p:cNvSpPr txBox="1"/>
-          <p:nvPr/>
-        </p:nvSpPr>
-        <p:spPr>
-          <a:xfrm>
-            <a:off x="10106041" y="426035"/>
-            <a:ext cx="2623931" cy="371060"/>
-          </a:xfrm>
-          <a:prstGeom prst="rect">
-            <a:avLst/>
-          </a:prstGeom>
-          <a:noFill/>
-        </p:spPr>
-        <p:txBody>
-          <a:bodyPr wrap="square" rtlCol="0">
-            <a:spAutoFit/>
-          </a:bodyPr>
-          <a:lstStyle/>
-          <a:p>
-            <a:pPr algn="ctr"/>
-            <a:r>
-              <a:rPr lang="en-US" dirty="0" smtClean="0"/>
-              <a:t>Model</a:t>
-            </a:r>
-            <a:endParaRPr lang="en-SG" dirty="0"/>
-          </a:p>
-        </p:txBody>
-      </p:sp>
-      <p:cxnSp>
-        <p:nvCxnSpPr>
-          <p:cNvPr id="45" name="Straight Connector 44"/>
-          <p:cNvCxnSpPr/>
-          <p:nvPr/>
-        </p:nvCxnSpPr>
-        <p:spPr>
-          <a:xfrm>
-            <a:off x="11463909" y="1181740"/>
-            <a:ext cx="7994" cy="1029600"/>
-          </a:xfrm>
-          <a:prstGeom prst="line">
-            <a:avLst/>
-          </a:prstGeom>
-          <a:ln>
-            <a:solidFill>
-              <a:schemeClr val="tx1"/>
-            </a:solidFill>
-            <a:prstDash val="dash"/>
-          </a:ln>
-        </p:spPr>
-        <p:style>
-          <a:lnRef idx="1">
-            <a:schemeClr val="accent1"/>
-          </a:lnRef>
-          <a:fillRef idx="0">
-            <a:schemeClr val="accent1"/>
-          </a:fillRef>
-          <a:effectRef idx="0">
-            <a:schemeClr val="accent1"/>
-          </a:effectRef>
-          <a:fontRef idx="minor">
-            <a:schemeClr val="tx1"/>
-          </a:fontRef>
-        </p:style>
-      </p:cxnSp>
-      <p:sp>
-        <p:nvSpPr>
-          <p:cNvPr id="46" name="Rectangle 45"/>
-          <p:cNvSpPr/>
-          <p:nvPr/>
-        </p:nvSpPr>
-        <p:spPr>
-          <a:xfrm>
-            <a:off x="11122313" y="847918"/>
-            <a:ext cx="683186" cy="318494"/>
-          </a:xfrm>
-          <a:prstGeom prst="rect">
-            <a:avLst/>
-          </a:prstGeom>
-        </p:spPr>
-        <p:style>
-          <a:lnRef idx="3">
-            <a:schemeClr val="lt1"/>
-          </a:lnRef>
-          <a:fillRef idx="1">
-            <a:schemeClr val="accent2"/>
-          </a:fillRef>
-          <a:effectRef idx="1">
-            <a:schemeClr val="accent2"/>
-          </a:effectRef>
-          <a:fontRef idx="minor">
-            <a:schemeClr val="lt1"/>
-          </a:fontRef>
-        </p:style>
-        <p:txBody>
-          <a:bodyPr rtlCol="0" anchor="ctr"/>
-          <a:lstStyle/>
-          <a:p>
-            <a:pPr algn="ctr"/>
-            <a:r>
-              <a:rPr lang="en-US" sz="1200" dirty="0" smtClean="0"/>
-              <a:t>:Model</a:t>
-            </a:r>
-            <a:endParaRPr lang="en-SG" sz="1200" dirty="0"/>
-          </a:p>
-        </p:txBody>
-      </p:sp>
-      <p:cxnSp>
-        <p:nvCxnSpPr>
-          <p:cNvPr id="41" name="Straight Arrow Connector 40"/>
-          <p:cNvCxnSpPr/>
-          <p:nvPr/>
-        </p:nvCxnSpPr>
-        <p:spPr>
-          <a:xfrm>
-            <a:off x="10194232" y="2248096"/>
-            <a:ext cx="1102891" cy="0"/>
-          </a:xfrm>
-          <a:prstGeom prst="straightConnector1">
-            <a:avLst/>
-          </a:prstGeom>
-          <a:ln>
-            <a:solidFill>
-              <a:schemeClr val="tx1"/>
-            </a:solidFill>
-            <a:tailEnd type="triangle"/>
-          </a:ln>
-        </p:spPr>
-        <p:style>
-          <a:lnRef idx="1">
-            <a:schemeClr val="accent1"/>
-          </a:lnRef>
-          <a:fillRef idx="0">
-            <a:schemeClr val="accent1"/>
-          </a:fillRef>
-          <a:effectRef idx="0">
-            <a:schemeClr val="accent1"/>
-          </a:effectRef>
-          <a:fontRef idx="minor">
-            <a:schemeClr val="tx1"/>
-          </a:fontRef>
-        </p:style>
-      </p:cxnSp>
-      <p:sp>
-        <p:nvSpPr>
-          <p:cNvPr id="48" name="Rectangle 47"/>
-          <p:cNvSpPr/>
-          <p:nvPr/>
-        </p:nvSpPr>
-        <p:spPr>
-          <a:xfrm>
-            <a:off x="11318869" y="2211340"/>
-            <a:ext cx="281428" cy="252615"/>
-          </a:xfrm>
-          <a:prstGeom prst="rect">
-            <a:avLst/>
-          </a:prstGeom>
-        </p:spPr>
-        <p:style>
-          <a:lnRef idx="2">
-            <a:schemeClr val="accent3"/>
-          </a:lnRef>
-          <a:fillRef idx="1">
-            <a:schemeClr val="lt1"/>
-          </a:fillRef>
-          <a:effectRef idx="0">
-            <a:schemeClr val="accent3"/>
-          </a:effectRef>
-          <a:fontRef idx="minor">
-            <a:schemeClr val="dk1"/>
-          </a:fontRef>
-        </p:style>
-        <p:txBody>
-          <a:bodyPr rtlCol="0" anchor="ctr"/>
-          <a:lstStyle/>
-          <a:p>
-            <a:pPr algn="ctr"/>
-            <a:endParaRPr lang="en-SG" dirty="0"/>
-          </a:p>
-        </p:txBody>
-      </p:sp>
-      <p:cxnSp>
-        <p:nvCxnSpPr>
-          <p:cNvPr id="49" name="Straight Connector 48"/>
-          <p:cNvCxnSpPr/>
-          <p:nvPr/>
-        </p:nvCxnSpPr>
-        <p:spPr>
-          <a:xfrm>
-            <a:off x="11467506" y="2497857"/>
-            <a:ext cx="1804" cy="3399874"/>
-          </a:xfrm>
-          <a:prstGeom prst="line">
-            <a:avLst/>
-          </a:prstGeom>
-          <a:ln>
-            <a:solidFill>
-              <a:schemeClr val="tx1"/>
-            </a:solidFill>
-            <a:prstDash val="dash"/>
-          </a:ln>
-        </p:spPr>
-        <p:style>
-          <a:lnRef idx="1">
-            <a:schemeClr val="accent1"/>
-          </a:lnRef>
-          <a:fillRef idx="0">
-            <a:schemeClr val="accent1"/>
-          </a:fillRef>
-          <a:effectRef idx="0">
-            <a:schemeClr val="accent1"/>
-          </a:effectRef>
-          <a:fontRef idx="minor">
-            <a:schemeClr val="tx1"/>
-          </a:fontRef>
-        </p:style>
-      </p:cxnSp>
-      <p:cxnSp>
-        <p:nvCxnSpPr>
-          <p:cNvPr id="51" name="Straight Arrow Connector 50"/>
-          <p:cNvCxnSpPr/>
-          <p:nvPr/>
-        </p:nvCxnSpPr>
-        <p:spPr>
-          <a:xfrm flipH="1">
-            <a:off x="8391629" y="2497857"/>
-            <a:ext cx="1521174" cy="0"/>
-          </a:xfrm>
-          <a:prstGeom prst="straightConnector1">
-            <a:avLst/>
-          </a:prstGeom>
-          <a:ln>
-            <a:solidFill>
-              <a:schemeClr val="tx1"/>
-            </a:solidFill>
-            <a:prstDash val="dash"/>
-            <a:tailEnd type="triangle"/>
-          </a:ln>
-        </p:spPr>
-        <p:style>
-          <a:lnRef idx="1">
-            <a:schemeClr val="accent1"/>
-          </a:lnRef>
-          <a:fillRef idx="0">
-            <a:schemeClr val="accent1"/>
-          </a:fillRef>
-          <a:effectRef idx="0">
-            <a:schemeClr val="accent1"/>
-          </a:effectRef>
-          <a:fontRef idx="minor">
-            <a:schemeClr val="tx1"/>
-          </a:fontRef>
-        </p:style>
-      </p:cxnSp>
-      <p:cxnSp>
-        <p:nvCxnSpPr>
-          <p:cNvPr id="54" name="Straight Arrow Connector 53"/>
-          <p:cNvCxnSpPr/>
-          <p:nvPr/>
-        </p:nvCxnSpPr>
-        <p:spPr>
-          <a:xfrm flipH="1">
-            <a:off x="10194231" y="2393641"/>
-            <a:ext cx="1102891" cy="0"/>
-          </a:xfrm>
-          <a:prstGeom prst="straightConnector1">
-            <a:avLst/>
-          </a:prstGeom>
-          <a:ln>
-            <a:solidFill>
-              <a:schemeClr val="tx1"/>
-            </a:solidFill>
-            <a:prstDash val="dash"/>
-            <a:tailEnd type="triangle"/>
-          </a:ln>
-        </p:spPr>
-        <p:style>
-          <a:lnRef idx="1">
-            <a:schemeClr val="accent1"/>
-          </a:lnRef>
-          <a:fillRef idx="0">
-            <a:schemeClr val="accent1"/>
-          </a:fillRef>
-          <a:effectRef idx="0">
-            <a:schemeClr val="accent1"/>
-          </a:effectRef>
-          <a:fontRef idx="minor">
-            <a:schemeClr val="tx1"/>
-          </a:fontRef>
-        </p:style>
-      </p:cxnSp>
-      <p:sp>
-        <p:nvSpPr>
-          <p:cNvPr id="56" name="TextBox 55"/>
-          <p:cNvSpPr txBox="1"/>
-          <p:nvPr/>
-        </p:nvSpPr>
-        <p:spPr>
-          <a:xfrm>
-            <a:off x="10128630" y="2052988"/>
-            <a:ext cx="1868557" cy="230832"/>
-          </a:xfrm>
-          <a:prstGeom prst="rect">
-            <a:avLst/>
-          </a:prstGeom>
-          <a:noFill/>
-        </p:spPr>
-        <p:txBody>
-          <a:bodyPr wrap="square" rtlCol="0">
-            <a:spAutoFit/>
-          </a:bodyPr>
-          <a:lstStyle/>
-          <a:p>
-            <a:r>
-              <a:rPr lang="en-US" sz="900" dirty="0" err="1" smtClean="0"/>
-              <a:t>addCommand</a:t>
-            </a:r>
-            <a:r>
-              <a:rPr lang="en-US" sz="900" dirty="0" smtClean="0"/>
-              <a:t>(meme, H)</a:t>
-            </a:r>
-            <a:endParaRPr lang="en-SG" sz="900" dirty="0"/>
-          </a:p>
-        </p:txBody>
-      </p:sp>
-      <p:cxnSp>
-        <p:nvCxnSpPr>
-          <p:cNvPr id="60" name="Straight Arrow Connector 59"/>
-          <p:cNvCxnSpPr/>
-          <p:nvPr/>
-        </p:nvCxnSpPr>
-        <p:spPr>
-          <a:xfrm flipH="1">
-            <a:off x="6872055" y="3022104"/>
-            <a:ext cx="1171091" cy="0"/>
-          </a:xfrm>
-          <a:prstGeom prst="straightConnector1">
-            <a:avLst/>
-          </a:prstGeom>
-          <a:ln>
-            <a:solidFill>
-              <a:schemeClr val="tx1"/>
-            </a:solidFill>
-            <a:prstDash val="dash"/>
-            <a:tailEnd type="triangle"/>
-          </a:ln>
-        </p:spPr>
-        <p:style>
-          <a:lnRef idx="1">
-            <a:schemeClr val="accent1"/>
-          </a:lnRef>
-          <a:fillRef idx="0">
-            <a:schemeClr val="accent1"/>
-          </a:fillRef>
-          <a:effectRef idx="0">
-            <a:schemeClr val="accent1"/>
-          </a:effectRef>
-          <a:fontRef idx="minor">
-            <a:schemeClr val="tx1"/>
-          </a:fontRef>
-        </p:style>
-      </p:cxnSp>
-      <p:sp>
-        <p:nvSpPr>
-          <p:cNvPr id="61" name="Rectangle 60"/>
-          <p:cNvSpPr/>
-          <p:nvPr/>
-        </p:nvSpPr>
-        <p:spPr>
-          <a:xfrm>
-            <a:off x="6529700" y="847918"/>
-            <a:ext cx="936197" cy="318494"/>
-          </a:xfrm>
-          <a:prstGeom prst="rect">
-            <a:avLst/>
-          </a:prstGeom>
-        </p:spPr>
-        <p:style>
-          <a:lnRef idx="2">
-            <a:schemeClr val="accent6">
-              <a:shade val="50000"/>
-            </a:schemeClr>
-          </a:lnRef>
-          <a:fillRef idx="1">
-            <a:schemeClr val="accent6"/>
-          </a:fillRef>
-          <a:effectRef idx="0">
-            <a:schemeClr val="accent6"/>
-          </a:effectRef>
-          <a:fontRef idx="minor">
-            <a:schemeClr val="lt1"/>
-          </a:fontRef>
-        </p:style>
-        <p:txBody>
-          <a:bodyPr rtlCol="0" anchor="ctr"/>
-          <a:lstStyle/>
-          <a:p>
-            <a:pPr algn="ctr"/>
-            <a:r>
-              <a:rPr lang="en-US" sz="900" dirty="0" smtClean="0"/>
-              <a:t>:</a:t>
-            </a:r>
-            <a:r>
-              <a:rPr lang="en-US" sz="900" dirty="0" err="1" smtClean="0"/>
-              <a:t>LogicManager</a:t>
-            </a:r>
-            <a:endParaRPr lang="en-SG" sz="900" dirty="0"/>
-          </a:p>
-        </p:txBody>
-      </p:sp>
-      <p:cxnSp>
-        <p:nvCxnSpPr>
-          <p:cNvPr id="64" name="Straight Connector 63"/>
-          <p:cNvCxnSpPr/>
-          <p:nvPr/>
-        </p:nvCxnSpPr>
-        <p:spPr>
-          <a:xfrm>
-            <a:off x="6712751" y="1181740"/>
-            <a:ext cx="31866" cy="4702226"/>
-          </a:xfrm>
-          <a:prstGeom prst="line">
-            <a:avLst/>
-          </a:prstGeom>
-          <a:ln>
-            <a:solidFill>
-              <a:schemeClr val="tx1"/>
-            </a:solidFill>
-            <a:prstDash val="dash"/>
-          </a:ln>
-        </p:spPr>
-        <p:style>
-          <a:lnRef idx="1">
-            <a:schemeClr val="accent1"/>
-          </a:lnRef>
-          <a:fillRef idx="0">
-            <a:schemeClr val="accent1"/>
-          </a:fillRef>
-          <a:effectRef idx="0">
-            <a:schemeClr val="accent1"/>
-          </a:effectRef>
-          <a:fontRef idx="minor">
-            <a:schemeClr val="tx1"/>
-          </a:fontRef>
-        </p:style>
-      </p:cxnSp>
-      <p:sp>
-        <p:nvSpPr>
-          <p:cNvPr id="65" name="Rectangle 64"/>
-          <p:cNvSpPr/>
-          <p:nvPr/>
-        </p:nvSpPr>
-        <p:spPr>
-          <a:xfrm>
-            <a:off x="6597265" y="1736966"/>
-            <a:ext cx="281428" cy="1521782"/>
-          </a:xfrm>
-          <a:prstGeom prst="rect">
-            <a:avLst/>
-          </a:prstGeom>
-        </p:spPr>
-        <p:style>
-          <a:lnRef idx="2">
-            <a:schemeClr val="accent6">
-              <a:shade val="50000"/>
-            </a:schemeClr>
-          </a:lnRef>
-          <a:fillRef idx="1">
-            <a:schemeClr val="accent6"/>
-          </a:fillRef>
-          <a:effectRef idx="0">
-            <a:schemeClr val="accent6"/>
-          </a:effectRef>
-          <a:fontRef idx="minor">
-            <a:schemeClr val="lt1"/>
-          </a:fontRef>
-        </p:style>
-        <p:txBody>
-          <a:bodyPr rtlCol="0" anchor="ctr"/>
-          <a:lstStyle/>
-          <a:p>
-            <a:pPr algn="ctr"/>
-            <a:endParaRPr lang="en-SG" dirty="0"/>
-          </a:p>
-        </p:txBody>
-      </p:sp>
-      <p:cxnSp>
-        <p:nvCxnSpPr>
-          <p:cNvPr id="68" name="Straight Arrow Connector 67"/>
-          <p:cNvCxnSpPr/>
-          <p:nvPr/>
-        </p:nvCxnSpPr>
-        <p:spPr>
-          <a:xfrm>
-            <a:off x="6913889" y="1825946"/>
-            <a:ext cx="1104016" cy="0"/>
-          </a:xfrm>
-          <a:prstGeom prst="straightConnector1">
-            <a:avLst/>
-          </a:prstGeom>
-          <a:ln>
-            <a:solidFill>
-              <a:schemeClr val="tx1"/>
-            </a:solidFill>
-            <a:tailEnd type="triangle"/>
-          </a:ln>
-        </p:spPr>
-        <p:style>
-          <a:lnRef idx="1">
-            <a:schemeClr val="accent1"/>
-          </a:lnRef>
-          <a:fillRef idx="0">
-            <a:schemeClr val="accent1"/>
-          </a:fillRef>
-          <a:effectRef idx="0">
-            <a:schemeClr val="accent1"/>
-          </a:effectRef>
-          <a:fontRef idx="minor">
-            <a:schemeClr val="tx1"/>
-          </a:fontRef>
-        </p:style>
-      </p:cxnSp>
-      <p:sp>
-        <p:nvSpPr>
-          <p:cNvPr id="71" name="TextBox 70"/>
-          <p:cNvSpPr txBox="1"/>
-          <p:nvPr/>
-        </p:nvSpPr>
-        <p:spPr>
-          <a:xfrm>
-            <a:off x="6827913" y="1564336"/>
-            <a:ext cx="1868557" cy="261610"/>
-          </a:xfrm>
-          <a:prstGeom prst="rect">
-            <a:avLst/>
-          </a:prstGeom>
-          <a:noFill/>
-        </p:spPr>
-        <p:txBody>
-          <a:bodyPr wrap="square" rtlCol="0">
-            <a:spAutoFit/>
-          </a:bodyPr>
-          <a:lstStyle/>
-          <a:p>
-            <a:r>
-              <a:rPr lang="en-US" sz="1050" dirty="0" err="1" smtClean="0"/>
-              <a:t>parseCommand</a:t>
-            </a:r>
-            <a:r>
-              <a:rPr lang="en-US" sz="1050" dirty="0" smtClean="0"/>
-              <a:t>(add)</a:t>
-            </a:r>
-            <a:endParaRPr lang="en-SG" sz="1050" dirty="0"/>
-          </a:p>
-        </p:txBody>
-      </p:sp>
       <p:sp>
         <p:nvSpPr>
           <p:cNvPr id="74" name="Rectangle 73"/>
@@ -4366,8 +3167,8 @@
         </p:nvSpPr>
         <p:spPr>
           <a:xfrm>
-            <a:off x="1585910" y="716860"/>
-            <a:ext cx="1203345" cy="477078"/>
+            <a:off x="1682412" y="716860"/>
+            <a:ext cx="1463617" cy="477078"/>
           </a:xfrm>
           <a:prstGeom prst="rect">
             <a:avLst/>
@@ -4395,14 +3196,14 @@
           <a:p>
             <a:pPr algn="ctr"/>
             <a:r>
-              <a:rPr lang="en-US" sz="1200" dirty="0" smtClean="0"/>
+              <a:rPr lang="en-US" sz="1400" dirty="0" smtClean="0"/>
               <a:t>:</a:t>
             </a:r>
             <a:r>
-              <a:rPr lang="en-US" sz="1200" dirty="0" err="1" smtClean="0"/>
+              <a:rPr lang="en-US" sz="1400" dirty="0" err="1" smtClean="0"/>
               <a:t>PersonListPanel</a:t>
             </a:r>
-            <a:endParaRPr lang="en-SG" sz="1200" dirty="0"/>
+            <a:endParaRPr lang="en-SG" sz="1400" dirty="0"/>
           </a:p>
         </p:txBody>
       </p:sp>
@@ -4482,43 +3283,6 @@
           </a:p>
         </p:txBody>
       </p:sp>
-      <p:cxnSp>
-        <p:nvCxnSpPr>
-          <p:cNvPr id="78" name="Straight Arrow Connector 77"/>
-          <p:cNvCxnSpPr/>
-          <p:nvPr/>
-        </p:nvCxnSpPr>
-        <p:spPr>
-          <a:xfrm flipH="1">
-            <a:off x="1117161" y="3127129"/>
-            <a:ext cx="5498410" cy="0"/>
-          </a:xfrm>
-          <a:prstGeom prst="straightConnector1">
-            <a:avLst/>
-          </a:prstGeom>
-          <a:ln>
-            <a:solidFill>
-              <a:schemeClr val="tx1"/>
-            </a:solidFill>
-            <a:prstDash val="dash"/>
-            <a:tailEnd type="triangle"/>
-          </a:ln>
-        </p:spPr>
-        <p:style>
-          <a:lnRef idx="1">
-            <a:schemeClr val="accent1"/>
-          </a:lnRef>
-          <a:fillRef idx="0">
-            <a:schemeClr val="accent1"/>
-          </a:fillRef>
-          <a:effectRef idx="0">
-            <a:schemeClr val="accent1"/>
-          </a:effectRef>
-          <a:fontRef idx="minor">
-            <a:schemeClr val="tx1"/>
-          </a:fontRef>
-        </p:style>
-      </p:cxnSp>
       <p:sp>
         <p:nvSpPr>
           <p:cNvPr id="80" name="Rectangle 79"/>
@@ -4527,8 +3291,8 @@
         </p:nvSpPr>
         <p:spPr>
           <a:xfrm>
-            <a:off x="2837514" y="711151"/>
-            <a:ext cx="1203345" cy="477078"/>
+            <a:off x="3211844" y="716860"/>
+            <a:ext cx="1709495" cy="477078"/>
           </a:xfrm>
           <a:prstGeom prst="rect">
             <a:avLst/>
@@ -4556,14 +3320,14 @@
           <a:p>
             <a:pPr algn="ctr"/>
             <a:r>
-              <a:rPr lang="en-US" sz="1200" dirty="0" smtClean="0"/>
+              <a:rPr lang="en-US" sz="1400" dirty="0" smtClean="0"/>
               <a:t>:</a:t>
             </a:r>
             <a:r>
-              <a:rPr lang="en-US" sz="1200" dirty="0" err="1" smtClean="0"/>
+              <a:rPr lang="en-US" sz="1400" dirty="0" err="1" smtClean="0"/>
               <a:t>PersonListViewCell</a:t>
             </a:r>
-            <a:endParaRPr lang="en-SG" sz="1200" dirty="0"/>
+            <a:endParaRPr lang="en-SG" sz="1400" dirty="0"/>
           </a:p>
         </p:txBody>
       </p:sp>
@@ -4611,8 +3375,8 @@
         </p:nvSpPr>
         <p:spPr>
           <a:xfrm>
-            <a:off x="3304324" y="3691495"/>
-            <a:ext cx="292643" cy="1610224"/>
+            <a:off x="3304324" y="3794653"/>
+            <a:ext cx="292643" cy="1646027"/>
           </a:xfrm>
           <a:prstGeom prst="rect">
             <a:avLst/>
@@ -4651,8 +3415,8 @@
         </p:nvCxnSpPr>
         <p:spPr>
           <a:xfrm flipV="1">
-            <a:off x="2247755" y="3837738"/>
-            <a:ext cx="990414" cy="1"/>
+            <a:off x="2247755" y="3820902"/>
+            <a:ext cx="1030246" cy="16838"/>
           </a:xfrm>
           <a:prstGeom prst="straightConnector1">
             <a:avLst/>
@@ -4687,7 +3451,7 @@
         </p:nvSpPr>
         <p:spPr>
           <a:xfrm>
-            <a:off x="2172303" y="3398920"/>
+            <a:off x="1074373" y="2737232"/>
             <a:ext cx="1093758" cy="461665"/>
           </a:xfrm>
           <a:prstGeom prst="rect">
@@ -4777,8 +3541,8 @@
         </p:nvSpPr>
         <p:spPr>
           <a:xfrm>
-            <a:off x="4280529" y="4057262"/>
-            <a:ext cx="203189" cy="1045090"/>
+            <a:off x="4280529" y="4057261"/>
+            <a:ext cx="203189" cy="1317379"/>
           </a:xfrm>
           <a:prstGeom prst="rect">
             <a:avLst/>
@@ -4819,8 +3583,8 @@
         </p:nvCxnSpPr>
         <p:spPr>
           <a:xfrm flipH="1">
-            <a:off x="4380583" y="5102352"/>
-            <a:ext cx="1541" cy="795379"/>
+            <a:off x="4380584" y="5374640"/>
+            <a:ext cx="1540" cy="523091"/>
           </a:xfrm>
           <a:prstGeom prst="line">
             <a:avLst/>
@@ -4891,7 +3655,7 @@
         </p:nvSpPr>
         <p:spPr>
           <a:xfrm>
-            <a:off x="3533887" y="3368545"/>
+            <a:off x="2239106" y="3332989"/>
             <a:ext cx="937117" cy="461665"/>
           </a:xfrm>
           <a:prstGeom prst="rect">
@@ -4911,7 +3675,7 @@
             </a:r>
             <a:r>
               <a:rPr lang="en-US" sz="1200" dirty="0" smtClean="0"/>
-              <a:t>(Person)</a:t>
+              <a:t>(person) </a:t>
             </a:r>
             <a:endParaRPr lang="en-SG" sz="1200" dirty="0"/>
           </a:p>
@@ -4925,7 +3689,7 @@
         </p:nvCxnSpPr>
         <p:spPr>
           <a:xfrm flipH="1" flipV="1">
-            <a:off x="3602795" y="5092336"/>
+            <a:off x="3604837" y="5368957"/>
             <a:ext cx="669601" cy="5683"/>
           </a:xfrm>
           <a:prstGeom prst="straightConnector1">
@@ -4962,7 +3726,7 @@
         </p:nvCxnSpPr>
         <p:spPr>
           <a:xfrm flipH="1">
-            <a:off x="2247755" y="5283383"/>
+            <a:off x="2240497" y="5430703"/>
             <a:ext cx="1030246" cy="2992"/>
           </a:xfrm>
           <a:prstGeom prst="straightConnector1">
@@ -4999,7 +3763,7 @@
         </p:nvCxnSpPr>
         <p:spPr>
           <a:xfrm flipH="1" flipV="1">
-            <a:off x="1099691" y="5529024"/>
+            <a:off x="1083932" y="5571097"/>
             <a:ext cx="850704" cy="10439"/>
           </a:xfrm>
           <a:prstGeom prst="straightConnector1">
@@ -5071,9 +3835,9 @@
           <p:nvPr/>
         </p:nvCxnSpPr>
         <p:spPr>
-          <a:xfrm>
-            <a:off x="4483718" y="4151970"/>
-            <a:ext cx="598822" cy="0"/>
+          <a:xfrm flipH="1">
+            <a:off x="4547009" y="4213570"/>
+            <a:ext cx="119338" cy="129894"/>
           </a:xfrm>
           <a:prstGeom prst="straightConnector1">
             <a:avLst/>
@@ -5108,8 +3872,8 @@
         </p:nvSpPr>
         <p:spPr>
           <a:xfrm>
-            <a:off x="4147246" y="720746"/>
-            <a:ext cx="1203345" cy="477078"/>
+            <a:off x="6554687" y="659742"/>
+            <a:ext cx="1783142" cy="468079"/>
           </a:xfrm>
           <a:prstGeom prst="rect">
             <a:avLst/>
@@ -5137,21 +3901,10 @@
           <a:p>
             <a:pPr algn="ctr"/>
             <a:r>
-              <a:rPr lang="en-US" sz="1100" dirty="0" smtClean="0"/>
-              <a:t>&lt;&lt;class&gt;&gt;</a:t>
-            </a:r>
-          </a:p>
-          <a:p>
-            <a:pPr algn="ctr"/>
-            <a:r>
-              <a:rPr lang="en-US" sz="1100" dirty="0" smtClean="0"/>
-              <a:t>:</a:t>
-            </a:r>
-            <a:r>
-              <a:rPr lang="en-US" sz="1100" dirty="0" err="1" smtClean="0"/>
-              <a:t>PriorityIndicatorComponent</a:t>
-            </a:r>
-            <a:endParaRPr lang="en-SG" sz="1100" dirty="0"/>
+              <a:rPr lang="en-US" sz="1400" dirty="0" err="1" smtClean="0"/>
+              <a:t>priorityShape:HBox</a:t>
+            </a:r>
+            <a:endParaRPr lang="en-US" sz="1400" dirty="0" smtClean="0"/>
           </a:p>
         </p:txBody>
       </p:sp>
@@ -5163,8 +3916,8 @@
         </p:nvCxnSpPr>
         <p:spPr>
           <a:xfrm>
-            <a:off x="5195105" y="1216148"/>
-            <a:ext cx="4947" cy="4695348"/>
+            <a:off x="7315200" y="1127821"/>
+            <a:ext cx="36508" cy="4820164"/>
           </a:xfrm>
           <a:prstGeom prst="line">
             <a:avLst/>
@@ -5199,8 +3952,8 @@
         </p:nvSpPr>
         <p:spPr>
           <a:xfrm>
-            <a:off x="5092813" y="4103788"/>
-            <a:ext cx="203189" cy="465774"/>
+            <a:off x="7249202" y="4403585"/>
+            <a:ext cx="203189" cy="349629"/>
           </a:xfrm>
           <a:prstGeom prst="rect">
             <a:avLst/>
@@ -5239,8 +3992,8 @@
         </p:nvSpPr>
         <p:spPr>
           <a:xfrm>
-            <a:off x="4458987" y="4119011"/>
-            <a:ext cx="588365" cy="415498"/>
+            <a:off x="8255114" y="4034578"/>
+            <a:ext cx="1867882" cy="461665"/>
           </a:xfrm>
           <a:prstGeom prst="rect">
             <a:avLst/>
@@ -5254,62 +4007,25 @@
           <a:lstStyle/>
           <a:p>
             <a:r>
-              <a:rPr lang="en-US" sz="700" dirty="0" err="1" smtClean="0"/>
+              <a:rPr lang="en-US" sz="1200" dirty="0" err="1" smtClean="0"/>
               <a:t>getBorder</a:t>
             </a:r>
             <a:r>
-              <a:rPr lang="en-US" sz="700" dirty="0" smtClean="0"/>
+              <a:rPr lang="en-US" sz="1200" dirty="0" smtClean="0"/>
               <a:t>(</a:t>
             </a:r>
             <a:r>
-              <a:rPr lang="en-US" sz="700" dirty="0" err="1" smtClean="0"/>
+              <a:rPr lang="en-US" sz="1200" dirty="0" err="1" smtClean="0"/>
               <a:t>isArchive</a:t>
             </a:r>
             <a:r>
-              <a:rPr lang="en-US" sz="700" dirty="0" smtClean="0"/>
-              <a:t>, Priority)</a:t>
-            </a:r>
-            <a:endParaRPr lang="en-SG" sz="700" dirty="0"/>
-          </a:p>
-        </p:txBody>
-      </p:sp>
-      <p:cxnSp>
-        <p:nvCxnSpPr>
-          <p:cNvPr id="86" name="Straight Arrow Connector 85"/>
-          <p:cNvCxnSpPr/>
-          <p:nvPr/>
-        </p:nvCxnSpPr>
-        <p:spPr>
-          <a:xfrm flipH="1">
-            <a:off x="4512249" y="4550408"/>
-            <a:ext cx="577507" cy="1"/>
-          </a:xfrm>
-          <a:prstGeom prst="straightConnector1">
-            <a:avLst/>
-          </a:prstGeom>
-          <a:ln>
-            <a:solidFill>
-              <a:schemeClr val="tx1"/>
-            </a:solidFill>
-            <a:prstDash val="dash"/>
-            <a:tailEnd type="triangle"/>
-          </a:ln>
-        </p:spPr>
-        <p:style>
-          <a:lnRef idx="1">
-            <a:schemeClr val="accent1"/>
-          </a:lnRef>
-          <a:fillRef idx="0">
-            <a:schemeClr val="accent1"/>
-          </a:fillRef>
-          <a:effectRef idx="0">
-            <a:schemeClr val="accent1"/>
-          </a:effectRef>
-          <a:fontRef idx="minor">
-            <a:schemeClr val="tx1"/>
-          </a:fontRef>
-        </p:style>
-      </p:cxnSp>
+              <a:rPr lang="en-US" sz="1200" dirty="0" smtClean="0"/>
+              <a:t>, priority)</a:t>
+            </a:r>
+            <a:endParaRPr lang="en-SG" sz="1200" dirty="0"/>
+          </a:p>
+        </p:txBody>
+      </p:sp>
       <p:sp>
         <p:nvSpPr>
           <p:cNvPr id="87" name="Rectangle 86"/>
@@ -5318,8 +4034,8 @@
         </p:nvSpPr>
         <p:spPr>
           <a:xfrm>
-            <a:off x="5410001" y="711151"/>
-            <a:ext cx="871109" cy="477078"/>
+            <a:off x="9376252" y="611064"/>
+            <a:ext cx="2014032" cy="544746"/>
           </a:xfrm>
           <a:prstGeom prst="rect">
             <a:avLst/>
@@ -5347,21 +4063,25 @@
           <a:p>
             <a:pPr algn="ctr"/>
             <a:r>
-              <a:rPr lang="en-US" sz="1100" dirty="0" smtClean="0"/>
-              <a:t>&lt;&lt;class&gt;&gt;</a:t>
+              <a:rPr lang="en-US" sz="1200" dirty="0"/>
+              <a:t>&lt;&lt;class</a:t>
+            </a:r>
+            <a:r>
+              <a:rPr lang="en-US" sz="1200" dirty="0" smtClean="0"/>
+              <a:t>&gt;&gt;</a:t>
             </a:r>
           </a:p>
           <a:p>
             <a:pPr algn="ctr"/>
             <a:r>
-              <a:rPr lang="en-US" sz="1100" dirty="0" smtClean="0"/>
+              <a:rPr lang="en-US" sz="1200" dirty="0" smtClean="0"/>
               <a:t>:</a:t>
             </a:r>
             <a:r>
-              <a:rPr lang="en-US" sz="1100" dirty="0" err="1" smtClean="0"/>
-              <a:t>ColorPicker</a:t>
-            </a:r>
-            <a:endParaRPr lang="en-SG" sz="1100" dirty="0"/>
+              <a:rPr lang="en-US" sz="1200" dirty="0" err="1" smtClean="0"/>
+              <a:t>PriorityIndicatorComponent</a:t>
+            </a:r>
+            <a:endParaRPr lang="en-SG" sz="1200" dirty="0" smtClean="0"/>
           </a:p>
         </p:txBody>
       </p:sp>
@@ -5373,7 +4093,7 @@
         </p:nvCxnSpPr>
         <p:spPr>
           <a:xfrm>
-            <a:off x="5859636" y="1166412"/>
+            <a:off x="10383268" y="1143443"/>
             <a:ext cx="0" cy="4745084"/>
           </a:xfrm>
           <a:prstGeom prst="line">
@@ -5409,8 +4129,8 @@
         </p:nvSpPr>
         <p:spPr>
           <a:xfrm>
-            <a:off x="5767637" y="4194299"/>
-            <a:ext cx="203189" cy="201001"/>
+            <a:off x="10297866" y="4443685"/>
+            <a:ext cx="203189" cy="238469"/>
           </a:xfrm>
           <a:prstGeom prst="rect">
             <a:avLst/>
@@ -5449,8 +4169,8 @@
         </p:nvCxnSpPr>
         <p:spPr>
           <a:xfrm>
-            <a:off x="5296002" y="4213181"/>
-            <a:ext cx="471635" cy="0"/>
+            <a:off x="7473638" y="4472361"/>
+            <a:ext cx="2827234" cy="6180"/>
           </a:xfrm>
           <a:prstGeom prst="straightConnector1">
             <a:avLst/>
@@ -5479,40 +4199,14 @@
       </p:cxnSp>
       <p:sp>
         <p:nvSpPr>
-          <p:cNvPr id="95" name="TextBox 94"/>
-          <p:cNvSpPr txBox="1"/>
-          <p:nvPr/>
-        </p:nvSpPr>
-        <p:spPr>
-          <a:xfrm>
-            <a:off x="5240360" y="3724595"/>
-            <a:ext cx="654508" cy="215444"/>
-          </a:xfrm>
-          <a:prstGeom prst="rect">
-            <a:avLst/>
-          </a:prstGeom>
-          <a:noFill/>
-        </p:spPr>
-        <p:txBody>
-          <a:bodyPr wrap="square" rtlCol="0">
-            <a:spAutoFit/>
-          </a:bodyPr>
-          <a:lstStyle/>
-          <a:p>
-            <a:endParaRPr lang="en-SG" sz="800" dirty="0"/>
-          </a:p>
-        </p:txBody>
-      </p:sp>
-      <p:sp>
-        <p:nvSpPr>
           <p:cNvPr id="96" name="Rectangle 95"/>
           <p:cNvSpPr/>
           <p:nvPr/>
         </p:nvSpPr>
         <p:spPr>
           <a:xfrm>
-            <a:off x="5100794" y="4676855"/>
-            <a:ext cx="203189" cy="336076"/>
+            <a:off x="7243069" y="4849196"/>
+            <a:ext cx="203189" cy="304393"/>
           </a:xfrm>
           <a:prstGeom prst="rect">
             <a:avLst/>
@@ -5545,166 +4239,14 @@
       </p:sp>
       <p:sp>
         <p:nvSpPr>
-          <p:cNvPr id="97" name="TextBox 96"/>
-          <p:cNvSpPr txBox="1"/>
-          <p:nvPr/>
-        </p:nvSpPr>
-        <p:spPr>
-          <a:xfrm>
-            <a:off x="4448119" y="4626803"/>
-            <a:ext cx="746985" cy="415498"/>
-          </a:xfrm>
-          <a:prstGeom prst="rect">
-            <a:avLst/>
-          </a:prstGeom>
-          <a:noFill/>
-        </p:spPr>
-        <p:txBody>
-          <a:bodyPr wrap="square" rtlCol="0">
-            <a:spAutoFit/>
-          </a:bodyPr>
-          <a:lstStyle/>
-          <a:p>
-            <a:r>
-              <a:rPr lang="en-US" sz="700" dirty="0" err="1" smtClean="0"/>
-              <a:t>getBackground</a:t>
-            </a:r>
-            <a:r>
-              <a:rPr lang="en-US" sz="700" dirty="0" smtClean="0"/>
-              <a:t>(</a:t>
-            </a:r>
-            <a:r>
-              <a:rPr lang="en-US" sz="700" dirty="0" err="1" smtClean="0"/>
-              <a:t>isArchive</a:t>
-            </a:r>
-            <a:r>
-              <a:rPr lang="en-US" sz="700" dirty="0" smtClean="0"/>
-              <a:t>, Priority)</a:t>
-            </a:r>
-            <a:endParaRPr lang="en-SG" sz="700" dirty="0"/>
-          </a:p>
-        </p:txBody>
-      </p:sp>
-      <p:cxnSp>
-        <p:nvCxnSpPr>
-          <p:cNvPr id="98" name="Straight Arrow Connector 97"/>
-          <p:cNvCxnSpPr/>
-          <p:nvPr/>
-        </p:nvCxnSpPr>
-        <p:spPr>
-          <a:xfrm flipH="1">
-            <a:off x="4512249" y="4994362"/>
-            <a:ext cx="577507" cy="1"/>
-          </a:xfrm>
-          <a:prstGeom prst="straightConnector1">
-            <a:avLst/>
-          </a:prstGeom>
-          <a:ln>
-            <a:solidFill>
-              <a:schemeClr val="tx1"/>
-            </a:solidFill>
-            <a:prstDash val="dash"/>
-            <a:tailEnd type="triangle"/>
-          </a:ln>
-        </p:spPr>
-        <p:style>
-          <a:lnRef idx="1">
-            <a:schemeClr val="accent1"/>
-          </a:lnRef>
-          <a:fillRef idx="0">
-            <a:schemeClr val="accent1"/>
-          </a:fillRef>
-          <a:effectRef idx="0">
-            <a:schemeClr val="accent1"/>
-          </a:effectRef>
-          <a:fontRef idx="minor">
-            <a:schemeClr val="tx1"/>
-          </a:fontRef>
-        </p:style>
-      </p:cxnSp>
-      <p:cxnSp>
-        <p:nvCxnSpPr>
-          <p:cNvPr id="99" name="Straight Arrow Connector 98"/>
-          <p:cNvCxnSpPr/>
-          <p:nvPr/>
-        </p:nvCxnSpPr>
-        <p:spPr>
-          <a:xfrm>
-            <a:off x="4513100" y="4676855"/>
-            <a:ext cx="576656" cy="0"/>
-          </a:xfrm>
-          <a:prstGeom prst="straightConnector1">
-            <a:avLst/>
-          </a:prstGeom>
-          <a:ln>
-            <a:solidFill>
-              <a:schemeClr val="tx1"/>
-            </a:solidFill>
-            <a:tailEnd type="triangle"/>
-          </a:ln>
-        </p:spPr>
-        <p:style>
-          <a:lnRef idx="1">
-            <a:schemeClr val="accent1"/>
-          </a:lnRef>
-          <a:fillRef idx="0">
-            <a:schemeClr val="accent1"/>
-          </a:fillRef>
-          <a:effectRef idx="0">
-            <a:schemeClr val="accent1"/>
-          </a:effectRef>
-          <a:fontRef idx="minor">
-            <a:schemeClr val="tx1"/>
-          </a:fontRef>
-        </p:style>
-      </p:cxnSp>
-      <p:cxnSp>
-        <p:nvCxnSpPr>
-          <p:cNvPr id="101" name="Straight Arrow Connector 100"/>
-          <p:cNvCxnSpPr/>
-          <p:nvPr/>
-        </p:nvCxnSpPr>
-        <p:spPr>
-          <a:xfrm flipH="1">
-            <a:off x="5302251" y="4387428"/>
-            <a:ext cx="459136" cy="0"/>
-          </a:xfrm>
-          <a:prstGeom prst="straightConnector1">
-            <a:avLst/>
-          </a:prstGeom>
-          <a:ln>
-            <a:solidFill>
-              <a:schemeClr val="tx1"/>
-            </a:solidFill>
-            <a:prstDash val="dash"/>
-            <a:tailEnd type="triangle"/>
-          </a:ln>
-        </p:spPr>
-        <p:style>
-          <a:lnRef idx="1">
-            <a:schemeClr val="accent1"/>
-          </a:lnRef>
-          <a:fillRef idx="0">
-            <a:schemeClr val="accent1"/>
-          </a:fillRef>
-          <a:effectRef idx="0">
-            <a:schemeClr val="accent1"/>
-          </a:effectRef>
-          <a:fontRef idx="minor">
-            <a:schemeClr val="tx1"/>
-          </a:fontRef>
-        </p:style>
-      </p:cxnSp>
-      <p:sp>
-        <p:nvSpPr>
           <p:cNvPr id="102" name="Rectangle 101"/>
           <p:cNvSpPr/>
           <p:nvPr/>
         </p:nvSpPr>
         <p:spPr>
           <a:xfrm>
-            <a:off x="5761387" y="4742573"/>
-            <a:ext cx="203189" cy="201001"/>
+            <a:off x="10283644" y="4898769"/>
+            <a:ext cx="203189" cy="224805"/>
           </a:xfrm>
           <a:prstGeom prst="rect">
             <a:avLst/>
@@ -5743,8 +4285,8 @@
         </p:nvCxnSpPr>
         <p:spPr>
           <a:xfrm>
-            <a:off x="5289752" y="4761455"/>
-            <a:ext cx="471635" cy="0"/>
+            <a:off x="7452204" y="4903740"/>
+            <a:ext cx="2848668" cy="3219"/>
           </a:xfrm>
           <a:prstGeom prst="straightConnector1">
             <a:avLst/>
@@ -5771,16 +4313,192 @@
           </a:fontRef>
         </p:style>
       </p:cxnSp>
+      <p:sp>
+        <p:nvSpPr>
+          <p:cNvPr id="109" name="TextBox 108"/>
+          <p:cNvSpPr txBox="1"/>
+          <p:nvPr/>
+        </p:nvSpPr>
+        <p:spPr>
+          <a:xfrm>
+            <a:off x="8069267" y="4482959"/>
+            <a:ext cx="2147154" cy="461665"/>
+          </a:xfrm>
+          <a:prstGeom prst="rect">
+            <a:avLst/>
+          </a:prstGeom>
+          <a:noFill/>
+        </p:spPr>
+        <p:txBody>
+          <a:bodyPr wrap="square" rtlCol="0">
+            <a:spAutoFit/>
+          </a:bodyPr>
+          <a:lstStyle/>
+          <a:p>
+            <a:r>
+              <a:rPr lang="en-US" sz="1200" dirty="0" err="1" smtClean="0"/>
+              <a:t>getBackground</a:t>
+            </a:r>
+            <a:r>
+              <a:rPr lang="en-US" sz="1200" dirty="0" smtClean="0"/>
+              <a:t>(</a:t>
+            </a:r>
+            <a:r>
+              <a:rPr lang="en-US" sz="1200" dirty="0" err="1" smtClean="0"/>
+              <a:t>isArchive</a:t>
+            </a:r>
+            <a:r>
+              <a:rPr lang="en-US" sz="1200" dirty="0" smtClean="0"/>
+              <a:t>, priority)</a:t>
+            </a:r>
+            <a:endParaRPr lang="en-SG" sz="1200" dirty="0"/>
+          </a:p>
+        </p:txBody>
+      </p:sp>
+      <p:sp>
+        <p:nvSpPr>
+          <p:cNvPr id="93" name="Rectangle 92"/>
+          <p:cNvSpPr/>
+          <p:nvPr/>
+        </p:nvSpPr>
+        <p:spPr>
+          <a:xfrm>
+            <a:off x="4354268" y="4159852"/>
+            <a:ext cx="203189" cy="1094407"/>
+          </a:xfrm>
+          <a:prstGeom prst="rect">
+            <a:avLst/>
+          </a:prstGeom>
+        </p:spPr>
+        <p:style>
+          <a:lnRef idx="2">
+            <a:schemeClr val="accent5">
+              <a:shade val="50000"/>
+            </a:schemeClr>
+          </a:lnRef>
+          <a:fillRef idx="1">
+            <a:schemeClr val="accent5"/>
+          </a:fillRef>
+          <a:effectRef idx="0">
+            <a:schemeClr val="accent5"/>
+          </a:effectRef>
+          <a:fontRef idx="minor">
+            <a:schemeClr val="lt1"/>
+          </a:fontRef>
+        </p:style>
+        <p:txBody>
+          <a:bodyPr rtlCol="0" anchor="ctr"/>
+          <a:lstStyle/>
+          <a:p>
+            <a:pPr algn="ctr"/>
+            <a:endParaRPr lang="en-SG" dirty="0"/>
+          </a:p>
+        </p:txBody>
+      </p:sp>
       <p:cxnSp>
         <p:nvCxnSpPr>
-          <p:cNvPr id="104" name="Straight Arrow Connector 103"/>
+          <p:cNvPr id="3" name="Straight Connector 2"/>
           <p:cNvCxnSpPr/>
           <p:nvPr/>
         </p:nvCxnSpPr>
         <p:spPr>
-          <a:xfrm flipH="1">
-            <a:off x="5296001" y="4935702"/>
-            <a:ext cx="459136" cy="0"/>
+          <a:xfrm>
+            <a:off x="4483718" y="4103788"/>
+            <a:ext cx="174642" cy="0"/>
+          </a:xfrm>
+          <a:prstGeom prst="line">
+            <a:avLst/>
+          </a:prstGeom>
+        </p:spPr>
+        <p:style>
+          <a:lnRef idx="1">
+            <a:schemeClr val="dk1"/>
+          </a:lnRef>
+          <a:fillRef idx="0">
+            <a:schemeClr val="dk1"/>
+          </a:fillRef>
+          <a:effectRef idx="0">
+            <a:schemeClr val="dk1"/>
+          </a:effectRef>
+          <a:fontRef idx="minor">
+            <a:schemeClr val="tx1"/>
+          </a:fontRef>
+        </p:style>
+      </p:cxnSp>
+      <p:cxnSp>
+        <p:nvCxnSpPr>
+          <p:cNvPr id="100" name="Straight Connector 99"/>
+          <p:cNvCxnSpPr/>
+          <p:nvPr/>
+        </p:nvCxnSpPr>
+        <p:spPr>
+          <a:xfrm>
+            <a:off x="4658736" y="4101075"/>
+            <a:ext cx="1464" cy="129114"/>
+          </a:xfrm>
+          <a:prstGeom prst="line">
+            <a:avLst/>
+          </a:prstGeom>
+        </p:spPr>
+        <p:style>
+          <a:lnRef idx="1">
+            <a:schemeClr val="dk1"/>
+          </a:lnRef>
+          <a:fillRef idx="0">
+            <a:schemeClr val="dk1"/>
+          </a:fillRef>
+          <a:effectRef idx="0">
+            <a:schemeClr val="dk1"/>
+          </a:effectRef>
+          <a:fontRef idx="minor">
+            <a:schemeClr val="tx1"/>
+          </a:fontRef>
+        </p:style>
+      </p:cxnSp>
+      <p:sp>
+        <p:nvSpPr>
+          <p:cNvPr id="110" name="TextBox 109"/>
+          <p:cNvSpPr txBox="1"/>
+          <p:nvPr/>
+        </p:nvSpPr>
+        <p:spPr>
+          <a:xfrm>
+            <a:off x="4591718" y="4005821"/>
+            <a:ext cx="1233026" cy="461665"/>
+          </a:xfrm>
+          <a:prstGeom prst="rect">
+            <a:avLst/>
+          </a:prstGeom>
+          <a:noFill/>
+        </p:spPr>
+        <p:txBody>
+          <a:bodyPr wrap="square" rtlCol="0">
+            <a:spAutoFit/>
+          </a:bodyPr>
+          <a:lstStyle/>
+          <a:p>
+            <a:r>
+              <a:rPr lang="en-US" sz="1200" dirty="0" err="1" smtClean="0"/>
+              <a:t>setPriorityShape</a:t>
+            </a:r>
+            <a:r>
+              <a:rPr lang="en-US" sz="1200" dirty="0" smtClean="0"/>
+              <a:t>(person)</a:t>
+            </a:r>
+            <a:endParaRPr lang="en-SG" sz="1200" dirty="0"/>
+          </a:p>
+        </p:txBody>
+      </p:sp>
+      <p:cxnSp>
+        <p:nvCxnSpPr>
+          <p:cNvPr id="113" name="Straight Arrow Connector 112"/>
+          <p:cNvCxnSpPr/>
+          <p:nvPr/>
+        </p:nvCxnSpPr>
+        <p:spPr>
+          <a:xfrm flipV="1">
+            <a:off x="4571039" y="4403585"/>
+            <a:ext cx="2687245" cy="10987"/>
           </a:xfrm>
           <a:prstGeom prst="straightConnector1">
             <a:avLst/>
@@ -5789,7 +4507,6 @@
             <a:solidFill>
               <a:schemeClr val="tx1"/>
             </a:solidFill>
-            <a:prstDash val="dash"/>
             <a:tailEnd type="triangle"/>
           </a:ln>
         </p:spPr>
@@ -5810,14 +4527,14 @@
       </p:cxnSp>
       <p:sp>
         <p:nvSpPr>
-          <p:cNvPr id="105" name="TextBox 104"/>
+          <p:cNvPr id="114" name="TextBox 113"/>
           <p:cNvSpPr txBox="1"/>
           <p:nvPr/>
         </p:nvSpPr>
         <p:spPr>
           <a:xfrm>
-            <a:off x="5266414" y="3897518"/>
-            <a:ext cx="675184" cy="307777"/>
+            <a:off x="5968223" y="3902425"/>
+            <a:ext cx="1555469" cy="461665"/>
           </a:xfrm>
           <a:prstGeom prst="rect">
             <a:avLst/>
@@ -5831,61 +4548,43 @@
           <a:lstStyle/>
           <a:p>
             <a:r>
-              <a:rPr lang="en-US" sz="700" dirty="0" err="1" smtClean="0"/>
-              <a:t>createBorder</a:t>
-            </a:r>
-            <a:r>
-              <a:rPr lang="en-US" sz="700" dirty="0" smtClean="0"/>
-              <a:t>(Paint)</a:t>
-            </a:r>
-            <a:endParaRPr lang="en-SG" sz="700" dirty="0"/>
-          </a:p>
-        </p:txBody>
-      </p:sp>
-      <p:sp>
-        <p:nvSpPr>
-          <p:cNvPr id="109" name="TextBox 108"/>
-          <p:cNvSpPr txBox="1"/>
-          <p:nvPr/>
-        </p:nvSpPr>
-        <p:spPr>
-          <a:xfrm>
-            <a:off x="5254521" y="4464131"/>
-            <a:ext cx="648216" cy="307777"/>
-          </a:xfrm>
-          <a:prstGeom prst="rect">
-            <a:avLst/>
-          </a:prstGeom>
-          <a:noFill/>
-        </p:spPr>
-        <p:txBody>
-          <a:bodyPr wrap="square" rtlCol="0">
-            <a:spAutoFit/>
-          </a:bodyPr>
-          <a:lstStyle/>
-          <a:p>
-            <a:r>
-              <a:rPr lang="en-US" sz="700" dirty="0" err="1" smtClean="0"/>
-              <a:t>createBackground</a:t>
-            </a:r>
-            <a:r>
-              <a:rPr lang="en-US" sz="700" dirty="0" smtClean="0"/>
-              <a:t>(Paint)</a:t>
-            </a:r>
-            <a:endParaRPr lang="en-SG" sz="700" dirty="0"/>
+              <a:rPr lang="en-US" sz="1200" dirty="0" err="1" smtClean="0"/>
+              <a:t>setBorder</a:t>
+            </a:r>
+            <a:r>
+              <a:rPr lang="en-US" sz="1200" dirty="0" smtClean="0"/>
+              <a:t>(</a:t>
+            </a:r>
+            <a:r>
+              <a:rPr lang="en-US" sz="1200" dirty="0" err="1" smtClean="0"/>
+              <a:t>isArchive</a:t>
+            </a:r>
+            <a:r>
+              <a:rPr lang="en-US" sz="1200" dirty="0" smtClean="0"/>
+              <a:t>, </a:t>
+            </a:r>
+            <a:r>
+              <a:rPr lang="en-US" sz="1200" dirty="0"/>
+              <a:t>p</a:t>
+            </a:r>
+            <a:r>
+              <a:rPr lang="en-US" sz="1200" dirty="0" smtClean="0"/>
+              <a:t>riority)</a:t>
+            </a:r>
+            <a:endParaRPr lang="en-SG" sz="1200" dirty="0"/>
           </a:p>
         </p:txBody>
       </p:sp>
       <p:cxnSp>
         <p:nvCxnSpPr>
-          <p:cNvPr id="112" name="Straight Arrow Connector 111"/>
+          <p:cNvPr id="116" name="Straight Arrow Connector 115"/>
           <p:cNvCxnSpPr/>
           <p:nvPr/>
         </p:nvCxnSpPr>
         <p:spPr>
-          <a:xfrm flipH="1" flipV="1">
-            <a:off x="119413" y="5728792"/>
-            <a:ext cx="850704" cy="10439"/>
+          <a:xfrm flipV="1">
+            <a:off x="4574132" y="4855854"/>
+            <a:ext cx="2658395" cy="15273"/>
           </a:xfrm>
           <a:prstGeom prst="straightConnector1">
             <a:avLst/>
@@ -5894,7 +4593,6 @@
             <a:solidFill>
               <a:schemeClr val="tx1"/>
             </a:solidFill>
-            <a:prstDash val="dash"/>
             <a:tailEnd type="triangle"/>
           </a:ln>
         </p:spPr>
@@ -5915,14 +4613,14 @@
       </p:cxnSp>
       <p:sp>
         <p:nvSpPr>
-          <p:cNvPr id="12" name="TextBox 11"/>
+          <p:cNvPr id="118" name="TextBox 117"/>
           <p:cNvSpPr txBox="1"/>
           <p:nvPr/>
         </p:nvSpPr>
         <p:spPr>
           <a:xfrm>
-            <a:off x="8072129" y="2956862"/>
-            <a:ext cx="304892" cy="369332"/>
+            <a:off x="5047053" y="4443685"/>
+            <a:ext cx="2084891" cy="461665"/>
           </a:xfrm>
           <a:prstGeom prst="rect">
             <a:avLst/>
@@ -5930,84 +4628,28 @@
           <a:noFill/>
         </p:spPr>
         <p:txBody>
-          <a:bodyPr wrap="none" rtlCol="0">
+          <a:bodyPr wrap="square" rtlCol="0">
             <a:spAutoFit/>
           </a:bodyPr>
           <a:lstStyle/>
           <a:p>
             <a:r>
-              <a:rPr lang="en-US" dirty="0" smtClean="0"/>
-              <a:t>X</a:t>
-            </a:r>
-            <a:endParaRPr lang="en-SG" dirty="0"/>
-          </a:p>
-        </p:txBody>
-      </p:sp>
-      <p:cxnSp>
-        <p:nvCxnSpPr>
-          <p:cNvPr id="91" name="Straight Connector 90"/>
-          <p:cNvCxnSpPr>
-            <a:stCxn id="16" idx="0"/>
-          </p:cNvCxnSpPr>
-          <p:nvPr/>
-        </p:nvCxnSpPr>
-        <p:spPr>
-          <a:xfrm>
-            <a:off x="10071362" y="2500712"/>
-            <a:ext cx="5202" cy="204986"/>
-          </a:xfrm>
-          <a:prstGeom prst="line">
-            <a:avLst/>
-          </a:prstGeom>
-          <a:ln>
-            <a:solidFill>
-              <a:schemeClr val="tx1"/>
-            </a:solidFill>
-            <a:prstDash val="dash"/>
-          </a:ln>
-        </p:spPr>
-        <p:style>
-          <a:lnRef idx="1">
-            <a:schemeClr val="accent1"/>
-          </a:lnRef>
-          <a:fillRef idx="0">
-            <a:schemeClr val="accent1"/>
-          </a:fillRef>
-          <a:effectRef idx="0">
-            <a:schemeClr val="accent1"/>
-          </a:effectRef>
-          <a:fontRef idx="minor">
-            <a:schemeClr val="tx1"/>
-          </a:fontRef>
-        </p:style>
-      </p:cxnSp>
-      <p:sp>
-        <p:nvSpPr>
-          <p:cNvPr id="16" name="TextBox 15"/>
-          <p:cNvSpPr txBox="1"/>
-          <p:nvPr/>
-        </p:nvSpPr>
-        <p:spPr>
-          <a:xfrm>
-            <a:off x="9918916" y="2500712"/>
-            <a:ext cx="304892" cy="369332"/>
-          </a:xfrm>
-          <a:prstGeom prst="rect">
-            <a:avLst/>
-          </a:prstGeom>
-          <a:noFill/>
-        </p:spPr>
-        <p:txBody>
-          <a:bodyPr wrap="none" rtlCol="0">
-            <a:spAutoFit/>
-          </a:bodyPr>
-          <a:lstStyle/>
-          <a:p>
-            <a:r>
-              <a:rPr lang="en-US" dirty="0" smtClean="0"/>
-              <a:t>X</a:t>
-            </a:r>
-            <a:endParaRPr lang="en-SG" dirty="0"/>
+              <a:rPr lang="en-US" sz="1200" dirty="0" err="1" smtClean="0"/>
+              <a:t>setBackground</a:t>
+            </a:r>
+            <a:r>
+              <a:rPr lang="en-US" sz="1200" dirty="0" smtClean="0"/>
+              <a:t>(</a:t>
+            </a:r>
+            <a:r>
+              <a:rPr lang="en-US" sz="1200" dirty="0" err="1" smtClean="0"/>
+              <a:t>isArchive</a:t>
+            </a:r>
+            <a:r>
+              <a:rPr lang="en-US" sz="1200" dirty="0" smtClean="0"/>
+              <a:t>, priority)</a:t>
+            </a:r>
+            <a:endParaRPr lang="en-SG" sz="1200" dirty="0"/>
           </a:p>
         </p:txBody>
       </p:sp>

</xml_diff>